<commit_message>
Homework F. Pareto Applied.
</commit_message>
<xml_diff>
--- a/빅데이터 분석 과제.pptx
+++ b/빅데이터 분석 과제.pptx
@@ -11,10 +11,11 @@
     <p:sldId id="263" r:id="rId5"/>
     <p:sldId id="264" r:id="rId6"/>
     <p:sldId id="265" r:id="rId7"/>
-    <p:sldId id="259" r:id="rId8"/>
-    <p:sldId id="260" r:id="rId9"/>
-    <p:sldId id="261" r:id="rId10"/>
-    <p:sldId id="262" r:id="rId11"/>
+    <p:sldId id="266" r:id="rId8"/>
+    <p:sldId id="259" r:id="rId9"/>
+    <p:sldId id="260" r:id="rId10"/>
+    <p:sldId id="261" r:id="rId11"/>
+    <p:sldId id="262" r:id="rId12"/>
   </p:sldIdLst>
   <p:sldSz cx="12192000" cy="6858000"/>
   <p:notesSz cx="6858000" cy="9144000"/>
@@ -3431,6 +3432,89 @@
           <p:cNvPr id="2" name="제목 1">
             <a:extLst>
               <a:ext uri="{FF2B5EF4-FFF2-40B4-BE49-F238E27FC236}">
+                <a16:creationId xmlns:a16="http://schemas.microsoft.com/office/drawing/2014/main" id="{AB48EF97-2352-08FD-FFD9-7EBC4728B6EE}"/>
+              </a:ext>
+            </a:extLst>
+          </p:cNvPr>
+          <p:cNvSpPr>
+            <a:spLocks noGrp="1"/>
+          </p:cNvSpPr>
+          <p:nvPr>
+            <p:ph type="title"/>
+          </p:nvPr>
+        </p:nvSpPr>
+        <p:spPr/>
+        <p:txBody>
+          <a:bodyPr/>
+          <a:lstStyle/>
+          <a:p>
+            <a:r>
+              <a:rPr lang="ko-KR" altLang="en-US" dirty="0"/>
+              <a:t>고찰 및 결론</a:t>
+            </a:r>
+          </a:p>
+        </p:txBody>
+      </p:sp>
+      <p:sp>
+        <p:nvSpPr>
+          <p:cNvPr id="3" name="내용 개체 틀 2">
+            <a:extLst>
+              <a:ext uri="{FF2B5EF4-FFF2-40B4-BE49-F238E27FC236}">
+                <a16:creationId xmlns:a16="http://schemas.microsoft.com/office/drawing/2014/main" id="{92B038EA-83CD-7475-F90A-695ABD2EF4EE}"/>
+              </a:ext>
+            </a:extLst>
+          </p:cNvPr>
+          <p:cNvSpPr>
+            <a:spLocks noGrp="1"/>
+          </p:cNvSpPr>
+          <p:nvPr>
+            <p:ph idx="1"/>
+          </p:nvPr>
+        </p:nvSpPr>
+        <p:spPr/>
+        <p:txBody>
+          <a:bodyPr/>
+          <a:lstStyle/>
+          <a:p>
+            <a:endParaRPr lang="ko-KR" altLang="en-US"/>
+          </a:p>
+        </p:txBody>
+      </p:sp>
+    </p:spTree>
+    <p:extLst>
+      <p:ext uri="{BB962C8B-B14F-4D97-AF65-F5344CB8AC3E}">
+        <p14:creationId xmlns:p14="http://schemas.microsoft.com/office/powerpoint/2010/main" val="1155636221"/>
+      </p:ext>
+    </p:extLst>
+  </p:cSld>
+  <p:clrMapOvr>
+    <a:masterClrMapping/>
+  </p:clrMapOvr>
+</p:sld>
+</file>
+
+<file path=ppt/slides/slide11.xml><?xml version="1.0" encoding="utf-8"?>
+<p:sld xmlns:a="http://schemas.openxmlformats.org/drawingml/2006/main" xmlns:r="http://schemas.openxmlformats.org/officeDocument/2006/relationships" xmlns:p="http://schemas.openxmlformats.org/presentationml/2006/main">
+  <p:cSld>
+    <p:spTree>
+      <p:nvGrpSpPr>
+        <p:cNvPr id="1" name=""/>
+        <p:cNvGrpSpPr/>
+        <p:nvPr/>
+      </p:nvGrpSpPr>
+      <p:grpSpPr>
+        <a:xfrm>
+          <a:off x="0" y="0"/>
+          <a:ext cx="0" cy="0"/>
+          <a:chOff x="0" y="0"/>
+          <a:chExt cx="0" cy="0"/>
+        </a:xfrm>
+      </p:grpSpPr>
+      <p:sp>
+        <p:nvSpPr>
+          <p:cNvPr id="2" name="제목 1">
+            <a:extLst>
+              <a:ext uri="{FF2B5EF4-FFF2-40B4-BE49-F238E27FC236}">
                 <a16:creationId xmlns:a16="http://schemas.microsoft.com/office/drawing/2014/main" id="{A8D31240-3758-9A95-84DA-DF516F8213F8}"/>
               </a:ext>
             </a:extLst>
@@ -4665,7 +4749,7 @@
               <a:t>근사 유니크 카운트</a:t>
             </a:r>
             <a:r>
-              <a:rPr lang="en-US" altLang="ko-KR"/>
+              <a:rPr lang="en-US" altLang="ko-KR" dirty="0"/>
               <a:t>)</a:t>
             </a:r>
             <a:endParaRPr lang="ko-KR" altLang="en-US" dirty="0"/>
@@ -4696,6 +4780,36 @@
           <a:xfrm>
             <a:off x="5799755" y="5597330"/>
             <a:ext cx="3724795" cy="371527"/>
+          </a:xfrm>
+          <a:prstGeom prst="rect">
+            <a:avLst/>
+          </a:prstGeom>
+        </p:spPr>
+      </p:pic>
+      <p:pic>
+        <p:nvPicPr>
+          <p:cNvPr id="7" name="그림 6">
+            <a:extLst>
+              <a:ext uri="{FF2B5EF4-FFF2-40B4-BE49-F238E27FC236}">
+                <a16:creationId xmlns:a16="http://schemas.microsoft.com/office/drawing/2014/main" id="{7C437593-DF6D-B3B3-C4BB-DFD8174D1514}"/>
+              </a:ext>
+            </a:extLst>
+          </p:cNvPr>
+          <p:cNvPicPr>
+            <a:picLocks noChangeAspect="1"/>
+          </p:cNvPicPr>
+          <p:nvPr/>
+        </p:nvPicPr>
+        <p:blipFill>
+          <a:blip r:embed="rId3"/>
+          <a:stretch>
+            <a:fillRect/>
+          </a:stretch>
+        </p:blipFill>
+        <p:spPr>
+          <a:xfrm>
+            <a:off x="1215951" y="4682803"/>
+            <a:ext cx="4448796" cy="1286054"/>
           </a:xfrm>
           <a:prstGeom prst="rect">
             <a:avLst/>
@@ -4720,7 +4834,13 @@
   <p:cSld>
     <p:spTree>
       <p:nvGrpSpPr>
-        <p:cNvPr id="1" name=""/>
+        <p:cNvPr id="1" name="">
+          <a:extLst>
+            <a:ext uri="{FF2B5EF4-FFF2-40B4-BE49-F238E27FC236}">
+              <a16:creationId xmlns:a16="http://schemas.microsoft.com/office/drawing/2014/main" id="{729AC8CA-16C3-C344-B076-9E64F490EF05}"/>
+            </a:ext>
+          </a:extLst>
+        </p:cNvPr>
         <p:cNvGrpSpPr/>
         <p:nvPr/>
       </p:nvGrpSpPr>
@@ -4737,7 +4857,7 @@
           <p:cNvPr id="2" name="제목 1">
             <a:extLst>
               <a:ext uri="{FF2B5EF4-FFF2-40B4-BE49-F238E27FC236}">
-                <a16:creationId xmlns:a16="http://schemas.microsoft.com/office/drawing/2014/main" id="{91FB26D8-6D51-62F5-95AF-C025CBC8FD34}"/>
+                <a16:creationId xmlns:a16="http://schemas.microsoft.com/office/drawing/2014/main" id="{834975DA-D870-1FB8-EF41-BF8B626CA006}"/>
               </a:ext>
             </a:extLst>
           </p:cNvPr>
@@ -4755,17 +4875,52 @@
           <a:p>
             <a:r>
               <a:rPr lang="ko-KR" altLang="en-US" dirty="0"/>
-              <a:t>구현</a:t>
-            </a:r>
-          </a:p>
-        </p:txBody>
-      </p:sp>
-      <p:sp>
-        <p:nvSpPr>
-          <p:cNvPr id="3" name="내용 개체 틀 2">
-            <a:extLst>
-              <a:ext uri="{FF2B5EF4-FFF2-40B4-BE49-F238E27FC236}">
-                <a16:creationId xmlns:a16="http://schemas.microsoft.com/office/drawing/2014/main" id="{B0C922AC-E46C-FA9B-3F6C-6F2FE142A01C}"/>
+              <a:t>과제 </a:t>
+            </a:r>
+            <a:r>
+              <a:rPr lang="en-US" altLang="ko-KR" dirty="0"/>
+              <a:t>4 : Pareto Front</a:t>
+            </a:r>
+            <a:endParaRPr lang="ko-KR" altLang="en-US" dirty="0"/>
+          </a:p>
+        </p:txBody>
+      </p:sp>
+      <p:pic>
+        <p:nvPicPr>
+          <p:cNvPr id="7" name="그림 6">
+            <a:extLst>
+              <a:ext uri="{FF2B5EF4-FFF2-40B4-BE49-F238E27FC236}">
+                <a16:creationId xmlns:a16="http://schemas.microsoft.com/office/drawing/2014/main" id="{4E3B6AB2-8D1D-9D0C-E61B-54596AE12484}"/>
+              </a:ext>
+            </a:extLst>
+          </p:cNvPr>
+          <p:cNvPicPr>
+            <a:picLocks noChangeAspect="1"/>
+          </p:cNvPicPr>
+          <p:nvPr/>
+        </p:nvPicPr>
+        <p:blipFill>
+          <a:blip r:embed="rId2"/>
+          <a:stretch>
+            <a:fillRect/>
+          </a:stretch>
+        </p:blipFill>
+        <p:spPr>
+          <a:xfrm>
+            <a:off x="1215951" y="4682803"/>
+            <a:ext cx="4448796" cy="1286054"/>
+          </a:xfrm>
+          <a:prstGeom prst="rect">
+            <a:avLst/>
+          </a:prstGeom>
+        </p:spPr>
+      </p:pic>
+      <p:sp>
+        <p:nvSpPr>
+          <p:cNvPr id="6" name="내용 개체 틀 5">
+            <a:extLst>
+              <a:ext uri="{FF2B5EF4-FFF2-40B4-BE49-F238E27FC236}">
+                <a16:creationId xmlns:a16="http://schemas.microsoft.com/office/drawing/2014/main" id="{6D742E03-63E2-41F0-4A91-15448B343629}"/>
               </a:ext>
             </a:extLst>
           </p:cNvPr>
@@ -4776,19 +4931,24 @@
             <p:ph idx="1"/>
           </p:nvPr>
         </p:nvSpPr>
-        <p:spPr/>
-        <p:txBody>
-          <a:bodyPr/>
-          <a:lstStyle/>
-          <a:p>
-            <a:endParaRPr lang="ko-KR" altLang="en-US"/>
+        <p:spPr>
+          <a:xfrm>
+            <a:off x="838200" y="1646001"/>
+            <a:ext cx="10515600" cy="4351338"/>
+          </a:xfrm>
+        </p:spPr>
+        <p:txBody>
+          <a:bodyPr/>
+          <a:lstStyle/>
+          <a:p>
+            <a:endParaRPr lang="ko-KR" altLang="en-US" dirty="0"/>
           </a:p>
         </p:txBody>
       </p:sp>
     </p:spTree>
     <p:extLst>
       <p:ext uri="{BB962C8B-B14F-4D97-AF65-F5344CB8AC3E}">
-        <p14:creationId xmlns:p14="http://schemas.microsoft.com/office/powerpoint/2010/main" val="4005580673"/>
+        <p14:creationId xmlns:p14="http://schemas.microsoft.com/office/powerpoint/2010/main" val="3572917459"/>
       </p:ext>
     </p:extLst>
   </p:cSld>
@@ -4820,7 +4980,7 @@
           <p:cNvPr id="2" name="제목 1">
             <a:extLst>
               <a:ext uri="{FF2B5EF4-FFF2-40B4-BE49-F238E27FC236}">
-                <a16:creationId xmlns:a16="http://schemas.microsoft.com/office/drawing/2014/main" id="{9A6431F0-98D9-1671-724F-F775161BE287}"/>
+                <a16:creationId xmlns:a16="http://schemas.microsoft.com/office/drawing/2014/main" id="{91FB26D8-6D51-62F5-95AF-C025CBC8FD34}"/>
               </a:ext>
             </a:extLst>
           </p:cNvPr>
@@ -4838,7 +4998,7 @@
           <a:p>
             <a:r>
               <a:rPr lang="ko-KR" altLang="en-US" dirty="0"/>
-              <a:t>실험 및 결과</a:t>
+              <a:t>구현</a:t>
             </a:r>
           </a:p>
         </p:txBody>
@@ -4848,7 +5008,7 @@
           <p:cNvPr id="3" name="내용 개체 틀 2">
             <a:extLst>
               <a:ext uri="{FF2B5EF4-FFF2-40B4-BE49-F238E27FC236}">
-                <a16:creationId xmlns:a16="http://schemas.microsoft.com/office/drawing/2014/main" id="{BEEAF650-4CBD-8BCE-1A07-14B3E99AF0BA}"/>
+                <a16:creationId xmlns:a16="http://schemas.microsoft.com/office/drawing/2014/main" id="{B0C922AC-E46C-FA9B-3F6C-6F2FE142A01C}"/>
               </a:ext>
             </a:extLst>
           </p:cNvPr>
@@ -4871,7 +5031,7 @@
     </p:spTree>
     <p:extLst>
       <p:ext uri="{BB962C8B-B14F-4D97-AF65-F5344CB8AC3E}">
-        <p14:creationId xmlns:p14="http://schemas.microsoft.com/office/powerpoint/2010/main" val="2700403687"/>
+        <p14:creationId xmlns:p14="http://schemas.microsoft.com/office/powerpoint/2010/main" val="4005580673"/>
       </p:ext>
     </p:extLst>
   </p:cSld>
@@ -4903,7 +5063,7 @@
           <p:cNvPr id="2" name="제목 1">
             <a:extLst>
               <a:ext uri="{FF2B5EF4-FFF2-40B4-BE49-F238E27FC236}">
-                <a16:creationId xmlns:a16="http://schemas.microsoft.com/office/drawing/2014/main" id="{AB48EF97-2352-08FD-FFD9-7EBC4728B6EE}"/>
+                <a16:creationId xmlns:a16="http://schemas.microsoft.com/office/drawing/2014/main" id="{9A6431F0-98D9-1671-724F-F775161BE287}"/>
               </a:ext>
             </a:extLst>
           </p:cNvPr>
@@ -4921,7 +5081,7 @@
           <a:p>
             <a:r>
               <a:rPr lang="ko-KR" altLang="en-US" dirty="0"/>
-              <a:t>고찰 및 결론</a:t>
+              <a:t>실험 및 결과</a:t>
             </a:r>
           </a:p>
         </p:txBody>
@@ -4931,7 +5091,7 @@
           <p:cNvPr id="3" name="내용 개체 틀 2">
             <a:extLst>
               <a:ext uri="{FF2B5EF4-FFF2-40B4-BE49-F238E27FC236}">
-                <a16:creationId xmlns:a16="http://schemas.microsoft.com/office/drawing/2014/main" id="{92B038EA-83CD-7475-F90A-695ABD2EF4EE}"/>
+                <a16:creationId xmlns:a16="http://schemas.microsoft.com/office/drawing/2014/main" id="{BEEAF650-4CBD-8BCE-1A07-14B3E99AF0BA}"/>
               </a:ext>
             </a:extLst>
           </p:cNvPr>
@@ -4954,7 +5114,7 @@
     </p:spTree>
     <p:extLst>
       <p:ext uri="{BB962C8B-B14F-4D97-AF65-F5344CB8AC3E}">
-        <p14:creationId xmlns:p14="http://schemas.microsoft.com/office/powerpoint/2010/main" val="1155636221"/>
+        <p14:creationId xmlns:p14="http://schemas.microsoft.com/office/powerpoint/2010/main" val="2700403687"/>
       </p:ext>
     </p:extLst>
   </p:cSld>

</xml_diff>